<commit_message>
metrics display updates + xgboost evaluation 'before' numbers
</commit_message>
<xml_diff>
--- a/Final Project - Group 7.pptx
+++ b/Final Project - Group 7.pptx
@@ -50,7 +50,7 @@
       <p:boldItalic r:id="rId33"/>
     </p:embeddedFont>
     <p:embeddedFont>
-      <p:font typeface="Oswald" panose="00000500000000000000" pitchFamily="2" charset="0"/>
+      <p:font typeface="Oswald" panose="00000500000000000000" pitchFamily="2" charset="-52"/>
       <p:regular r:id="rId34"/>
       <p:bold r:id="rId35"/>
     </p:embeddedFont>
@@ -16708,7 +16708,7 @@
           <p:nvPr>
             <p:extLst>
               <p:ext uri="{D42A27DB-BD31-4B8C-83A1-F6EECF244321}">
-                <p14:modId xmlns:p14="http://schemas.microsoft.com/office/powerpoint/2010/main" val="1749229953"/>
+                <p14:modId xmlns:p14="http://schemas.microsoft.com/office/powerpoint/2010/main" val="4049643444"/>
               </p:ext>
             </p:extLst>
           </p:nvPr>
@@ -17539,7 +17539,27 @@
                     <a:bodyPr/>
                     <a:lstStyle/>
                     <a:p>
-                      <a:endParaRPr lang="en-CA" dirty="0"/>
+                      <a:pPr algn="ctr"/>
+                      <a:endParaRPr lang="en-CA" dirty="0">
+                        <a:solidFill>
+                          <a:schemeClr val="bg1">
+                            <a:lumMod val="50000"/>
+                          </a:schemeClr>
+                        </a:solidFill>
+                      </a:endParaRPr>
+                    </a:p>
+                    <a:p>
+                      <a:pPr algn="ctr"/>
+                      <a:r>
+                        <a:rPr lang="en-CA" dirty="0">
+                          <a:solidFill>
+                            <a:schemeClr val="bg1">
+                              <a:lumMod val="50000"/>
+                            </a:schemeClr>
+                          </a:solidFill>
+                        </a:rPr>
+                        <a:t>76%</a:t>
+                      </a:r>
                     </a:p>
                   </a:txBody>
                   <a:tcPr/>
@@ -17549,7 +17569,27 @@
                     <a:bodyPr/>
                     <a:lstStyle/>
                     <a:p>
-                      <a:endParaRPr lang="en-CA"/>
+                      <a:pPr algn="ctr"/>
+                      <a:endParaRPr lang="en-CA" dirty="0">
+                        <a:solidFill>
+                          <a:schemeClr val="bg1">
+                            <a:lumMod val="50000"/>
+                          </a:schemeClr>
+                        </a:solidFill>
+                      </a:endParaRPr>
+                    </a:p>
+                    <a:p>
+                      <a:pPr algn="ctr"/>
+                      <a:r>
+                        <a:rPr lang="en-CA" dirty="0">
+                          <a:solidFill>
+                            <a:schemeClr val="bg1">
+                              <a:lumMod val="50000"/>
+                            </a:schemeClr>
+                          </a:solidFill>
+                        </a:rPr>
+                        <a:t>76%</a:t>
+                      </a:r>
                     </a:p>
                   </a:txBody>
                   <a:tcPr/>
@@ -17559,7 +17599,27 @@
                     <a:bodyPr/>
                     <a:lstStyle/>
                     <a:p>
-                      <a:endParaRPr lang="en-CA"/>
+                      <a:pPr algn="ctr"/>
+                      <a:endParaRPr lang="en-CA" dirty="0">
+                        <a:solidFill>
+                          <a:schemeClr val="bg1">
+                            <a:lumMod val="50000"/>
+                          </a:schemeClr>
+                        </a:solidFill>
+                      </a:endParaRPr>
+                    </a:p>
+                    <a:p>
+                      <a:pPr algn="ctr"/>
+                      <a:r>
+                        <a:rPr lang="en-CA" dirty="0">
+                          <a:solidFill>
+                            <a:schemeClr val="bg1">
+                              <a:lumMod val="50000"/>
+                            </a:schemeClr>
+                          </a:solidFill>
+                        </a:rPr>
+                        <a:t>76%</a:t>
+                      </a:r>
                     </a:p>
                   </a:txBody>
                   <a:tcPr/>
@@ -17569,7 +17629,27 @@
                     <a:bodyPr/>
                     <a:lstStyle/>
                     <a:p>
-                      <a:endParaRPr lang="en-CA" dirty="0"/>
+                      <a:pPr algn="ctr"/>
+                      <a:endParaRPr lang="en-CA" dirty="0">
+                        <a:solidFill>
+                          <a:schemeClr val="bg1">
+                            <a:lumMod val="50000"/>
+                          </a:schemeClr>
+                        </a:solidFill>
+                      </a:endParaRPr>
+                    </a:p>
+                    <a:p>
+                      <a:pPr algn="ctr"/>
+                      <a:r>
+                        <a:rPr lang="en-CA" dirty="0">
+                          <a:solidFill>
+                            <a:schemeClr val="bg1">
+                              <a:lumMod val="50000"/>
+                            </a:schemeClr>
+                          </a:solidFill>
+                        </a:rPr>
+                        <a:t>76%</a:t>
+                      </a:r>
                     </a:p>
                   </a:txBody>
                   <a:tcPr/>

</xml_diff>

<commit_message>
update images and the slides
</commit_message>
<xml_diff>
--- a/Final Project - Group 7.pptx
+++ b/Final Project - Group 7.pptx
@@ -28,8 +28,8 @@
     <p:sldId id="298" r:id="rId19"/>
     <p:sldId id="299" r:id="rId20"/>
     <p:sldId id="276" r:id="rId21"/>
-    <p:sldId id="279" r:id="rId22"/>
-    <p:sldId id="277" r:id="rId23"/>
+    <p:sldId id="277" r:id="rId22"/>
+    <p:sldId id="279" r:id="rId23"/>
     <p:sldId id="281" r:id="rId24"/>
     <p:sldId id="282" r:id="rId25"/>
     <p:sldId id="264" r:id="rId26"/>
@@ -309,8 +309,8 @@
             <p14:sldId id="298"/>
             <p14:sldId id="299"/>
             <p14:sldId id="276"/>
+            <p14:sldId id="277"/>
             <p14:sldId id="279"/>
-            <p14:sldId id="277"/>
             <p14:sldId id="281"/>
             <p14:sldId id="282"/>
             <p14:sldId id="264"/>
@@ -16708,14 +16708,14 @@
           <p:nvPr>
             <p:extLst>
               <p:ext uri="{D42A27DB-BD31-4B8C-83A1-F6EECF244321}">
-                <p14:modId xmlns:p14="http://schemas.microsoft.com/office/powerpoint/2010/main" val="1749229953"/>
+                <p14:modId xmlns:p14="http://schemas.microsoft.com/office/powerpoint/2010/main" val="474197789"/>
               </p:ext>
             </p:extLst>
           </p:nvPr>
         </p:nvGraphicFramePr>
         <p:xfrm>
           <a:off x="678180" y="1211579"/>
-          <a:ext cx="7711440" cy="3621267"/>
+          <a:ext cx="7711440" cy="3200401"/>
         </p:xfrm>
         <a:graphic>
           <a:graphicData uri="http://schemas.openxmlformats.org/drawingml/2006/table">
@@ -16760,7 +16760,7 @@
                   </a:extLst>
                 </a:gridCol>
               </a:tblGrid>
-              <a:tr h="706469">
+              <a:tr h="810160">
                 <a:tc>
                   <a:txBody>
                     <a:bodyPr/>
@@ -17014,7 +17014,7 @@
                   </a:ext>
                 </a:extLst>
               </a:tr>
-              <a:tr h="538208">
+              <a:tr h="810160">
                 <a:tc>
                   <a:txBody>
                     <a:bodyPr/>
@@ -17178,7 +17178,7 @@
                   </a:ext>
                 </a:extLst>
               </a:tr>
-              <a:tr h="695187">
+              <a:tr h="769921">
                 <a:tc>
                   <a:txBody>
                     <a:bodyPr/>
@@ -17342,7 +17342,7 @@
                   </a:ext>
                 </a:extLst>
               </a:tr>
-              <a:tr h="706469">
+              <a:tr h="810160">
                 <a:tc>
                   <a:txBody>
                     <a:bodyPr/>
@@ -17496,90 +17496,6 @@
                   </a:ext>
                 </a:extLst>
               </a:tr>
-              <a:tr h="706469">
-                <a:tc>
-                  <a:txBody>
-                    <a:bodyPr/>
-                    <a:lstStyle/>
-                    <a:p>
-                      <a:r>
-                        <a:rPr lang="en-CA" b="1" dirty="0">
-                          <a:solidFill>
-                            <a:schemeClr val="bg1">
-                              <a:lumMod val="50000"/>
-                            </a:schemeClr>
-                          </a:solidFill>
-                        </a:rPr>
-                        <a:t>Xgboosting</a:t>
-                      </a:r>
-                    </a:p>
-                    <a:p>
-                      <a:endParaRPr lang="en-CA" dirty="0">
-                        <a:solidFill>
-                          <a:schemeClr val="bg1">
-                            <a:lumMod val="50000"/>
-                          </a:schemeClr>
-                        </a:solidFill>
-                      </a:endParaRPr>
-                    </a:p>
-                    <a:p>
-                      <a:endParaRPr lang="en-CA" dirty="0">
-                        <a:solidFill>
-                          <a:schemeClr val="bg1">
-                            <a:lumMod val="50000"/>
-                          </a:schemeClr>
-                        </a:solidFill>
-                      </a:endParaRPr>
-                    </a:p>
-                  </a:txBody>
-                  <a:tcPr/>
-                </a:tc>
-                <a:tc>
-                  <a:txBody>
-                    <a:bodyPr/>
-                    <a:lstStyle/>
-                    <a:p>
-                      <a:endParaRPr lang="en-CA" dirty="0"/>
-                    </a:p>
-                  </a:txBody>
-                  <a:tcPr/>
-                </a:tc>
-                <a:tc>
-                  <a:txBody>
-                    <a:bodyPr/>
-                    <a:lstStyle/>
-                    <a:p>
-                      <a:endParaRPr lang="en-CA"/>
-                    </a:p>
-                  </a:txBody>
-                  <a:tcPr/>
-                </a:tc>
-                <a:tc>
-                  <a:txBody>
-                    <a:bodyPr/>
-                    <a:lstStyle/>
-                    <a:p>
-                      <a:endParaRPr lang="en-CA"/>
-                    </a:p>
-                  </a:txBody>
-                  <a:tcPr/>
-                </a:tc>
-                <a:tc>
-                  <a:txBody>
-                    <a:bodyPr/>
-                    <a:lstStyle/>
-                    <a:p>
-                      <a:endParaRPr lang="en-CA" dirty="0"/>
-                    </a:p>
-                  </a:txBody>
-                  <a:tcPr/>
-                </a:tc>
-                <a:extLst>
-                  <a:ext uri="{0D108BD9-81ED-4DB2-BD59-A6C34878D82A}">
-                    <a16:rowId xmlns:a16="http://schemas.microsoft.com/office/drawing/2014/main" val="2440399944"/>
-                  </a:ext>
-                </a:extLst>
-              </a:tr>
             </a:tbl>
           </a:graphicData>
         </a:graphic>
@@ -17687,7 +17603,7 @@
           <p:nvPr>
             <p:extLst>
               <p:ext uri="{D42A27DB-BD31-4B8C-83A1-F6EECF244321}">
-                <p14:modId xmlns:p14="http://schemas.microsoft.com/office/powerpoint/2010/main" val="84348703"/>
+                <p14:modId xmlns:p14="http://schemas.microsoft.com/office/powerpoint/2010/main" val="183640208"/>
               </p:ext>
             </p:extLst>
           </p:nvPr>
@@ -18176,6 +18092,15 @@
                     <a:bodyPr/>
                     <a:lstStyle/>
                     <a:p>
+                      <a:endParaRPr lang="en-CA" b="1" dirty="0">
+                        <a:solidFill>
+                          <a:schemeClr val="bg1">
+                            <a:lumMod val="50000"/>
+                          </a:schemeClr>
+                        </a:solidFill>
+                      </a:endParaRPr>
+                    </a:p>
+                    <a:p>
                       <a:r>
                         <a:rPr lang="en-CA" b="1" dirty="0">
                           <a:solidFill>
@@ -18193,13 +18118,6 @@
                           <a:schemeClr val="bg1">
                             <a:lumMod val="50000"/>
                           </a:schemeClr>
-                        </a:solidFill>
-                      </a:endParaRPr>
-                    </a:p>
-                    <a:p>
-                      <a:endParaRPr lang="en-CA" dirty="0">
-                        <a:solidFill>
-                          <a:srgbClr val="C00000"/>
                         </a:solidFill>
                       </a:endParaRPr>
                     </a:p>
@@ -18969,6 +18887,186 @@
   <p:cSld>
     <p:spTree>
       <p:nvGrpSpPr>
+        <p:cNvPr id="1" name="Shape 124"/>
+        <p:cNvGrpSpPr/>
+        <p:nvPr/>
+      </p:nvGrpSpPr>
+      <p:grpSpPr>
+        <a:xfrm>
+          <a:off x="0" y="0"/>
+          <a:ext cx="0" cy="0"/>
+          <a:chOff x="0" y="0"/>
+          <a:chExt cx="0" cy="0"/>
+        </a:xfrm>
+      </p:grpSpPr>
+      <p:sp>
+        <p:nvSpPr>
+          <p:cNvPr id="126" name="Google Shape;126;p20"/>
+          <p:cNvSpPr txBox="1">
+            <a:spLocks noGrp="1"/>
+          </p:cNvSpPr>
+          <p:nvPr>
+            <p:ph type="body" idx="1"/>
+          </p:nvPr>
+        </p:nvSpPr>
+        <p:spPr>
+          <a:xfrm>
+            <a:off x="311700" y="1219200"/>
+            <a:ext cx="8520600" cy="2590800"/>
+          </a:xfrm>
+          <a:prstGeom prst="rect">
+            <a:avLst/>
+          </a:prstGeom>
+        </p:spPr>
+        <p:txBody>
+          <a:bodyPr spcFirstLastPara="1" wrap="square" lIns="91425" tIns="91425" rIns="91425" bIns="91425" anchor="t" anchorCtr="0">
+            <a:noAutofit/>
+          </a:bodyPr>
+          <a:lstStyle/>
+          <a:p>
+            <a:pPr marL="0" lvl="0" indent="0" algn="l" rtl="0">
+              <a:spcBef>
+                <a:spcPts val="1600"/>
+              </a:spcBef>
+              <a:spcAft>
+                <a:spcPts val="0"/>
+              </a:spcAft>
+              <a:buNone/>
+            </a:pPr>
+            <a:endParaRPr sz="2100" b="1" dirty="0">
+              <a:solidFill>
+                <a:schemeClr val="dk1"/>
+              </a:solidFill>
+            </a:endParaRPr>
+          </a:p>
+          <a:p>
+            <a:pPr marL="0" lvl="0" indent="0" algn="l" rtl="0">
+              <a:lnSpc>
+                <a:spcPct val="200000"/>
+              </a:lnSpc>
+              <a:spcBef>
+                <a:spcPts val="1600"/>
+              </a:spcBef>
+              <a:spcAft>
+                <a:spcPts val="1600"/>
+              </a:spcAft>
+              <a:buNone/>
+            </a:pPr>
+            <a:endParaRPr dirty="0"/>
+          </a:p>
+        </p:txBody>
+      </p:sp>
+      <p:pic>
+        <p:nvPicPr>
+          <p:cNvPr id="7" name="Picture 6">
+            <a:extLst>
+              <a:ext uri="{FF2B5EF4-FFF2-40B4-BE49-F238E27FC236}">
+                <a16:creationId xmlns:a16="http://schemas.microsoft.com/office/drawing/2014/main" id="{D288D13A-8853-4E82-929C-C2517408654A}"/>
+              </a:ext>
+            </a:extLst>
+          </p:cNvPr>
+          <p:cNvPicPr>
+            <a:picLocks noChangeAspect="1"/>
+          </p:cNvPicPr>
+          <p:nvPr/>
+        </p:nvPicPr>
+        <p:blipFill>
+          <a:blip r:embed="rId3"/>
+          <a:stretch>
+            <a:fillRect/>
+          </a:stretch>
+        </p:blipFill>
+        <p:spPr>
+          <a:xfrm>
+            <a:off x="4335780" y="480060"/>
+            <a:ext cx="4511040" cy="4351019"/>
+          </a:xfrm>
+          <a:prstGeom prst="rect">
+            <a:avLst/>
+          </a:prstGeom>
+        </p:spPr>
+      </p:pic>
+      <p:sp>
+        <p:nvSpPr>
+          <p:cNvPr id="8" name="Arrow: Pentagon 7">
+            <a:extLst>
+              <a:ext uri="{FF2B5EF4-FFF2-40B4-BE49-F238E27FC236}">
+                <a16:creationId xmlns:a16="http://schemas.microsoft.com/office/drawing/2014/main" id="{01CA22A9-BCFC-432E-ADF5-73FBB931FB0A}"/>
+              </a:ext>
+            </a:extLst>
+          </p:cNvPr>
+          <p:cNvSpPr/>
+          <p:nvPr/>
+        </p:nvSpPr>
+        <p:spPr>
+          <a:xfrm>
+            <a:off x="266700" y="1653540"/>
+            <a:ext cx="3863340" cy="1988820"/>
+          </a:xfrm>
+          <a:prstGeom prst="homePlate">
+            <a:avLst/>
+          </a:prstGeom>
+          <a:solidFill>
+            <a:schemeClr val="accent4">
+              <a:lumMod val="40000"/>
+              <a:lumOff val="60000"/>
+            </a:schemeClr>
+          </a:solidFill>
+        </p:spPr>
+        <p:style>
+          <a:lnRef idx="2">
+            <a:schemeClr val="accent1">
+              <a:shade val="50000"/>
+            </a:schemeClr>
+          </a:lnRef>
+          <a:fillRef idx="1">
+            <a:schemeClr val="accent1"/>
+          </a:fillRef>
+          <a:effectRef idx="0">
+            <a:schemeClr val="accent1"/>
+          </a:effectRef>
+          <a:fontRef idx="minor">
+            <a:schemeClr val="lt1"/>
+          </a:fontRef>
+        </p:style>
+        <p:txBody>
+          <a:bodyPr rtlCol="0" anchor="ctr"/>
+          <a:lstStyle/>
+          <a:p>
+            <a:pPr algn="ctr"/>
+            <a:r>
+              <a:rPr lang="en-CA" sz="1600" b="1" dirty="0"/>
+              <a:t>General Overview </a:t>
+            </a:r>
+            <a:r>
+              <a:rPr lang="en-CA" sz="1600" dirty="0"/>
+              <a:t>of Total number of patients, Gender breakdown, Age category , Race category with target variable Heart disease</a:t>
+            </a:r>
+            <a:r>
+              <a:rPr lang="en-CA" dirty="0"/>
+              <a:t>. </a:t>
+            </a:r>
+          </a:p>
+        </p:txBody>
+      </p:sp>
+    </p:spTree>
+    <p:extLst>
+      <p:ext uri="{BB962C8B-B14F-4D97-AF65-F5344CB8AC3E}">
+        <p14:creationId xmlns:p14="http://schemas.microsoft.com/office/powerpoint/2010/main" val="437393567"/>
+      </p:ext>
+    </p:extLst>
+  </p:cSld>
+  <p:clrMapOvr>
+    <a:masterClrMapping/>
+  </p:clrMapOvr>
+</p:sld>
+</file>
+
+<file path=ppt/slides/slide22.xml><?xml version="1.0" encoding="utf-8"?>
+<p:sld xmlns:a="http://schemas.openxmlformats.org/drawingml/2006/main" xmlns:r="http://schemas.openxmlformats.org/officeDocument/2006/relationships" xmlns:p="http://schemas.openxmlformats.org/presentationml/2006/main">
+  <p:cSld>
+    <p:spTree>
+      <p:nvGrpSpPr>
         <p:cNvPr id="1" name=""/>
         <p:cNvGrpSpPr/>
         <p:nvPr/>
@@ -19012,6 +19110,12 @@
             <a:br>
               <a:rPr lang="en-CA" dirty="0"/>
             </a:br>
+            <a:br>
+              <a:rPr lang="en-CA" dirty="0"/>
+            </a:br>
+            <a:br>
+              <a:rPr lang="en-CA" dirty="0"/>
+            </a:br>
             <a:endParaRPr lang="en-CA" dirty="0"/>
           </a:p>
         </p:txBody>
@@ -19046,25 +19150,21 @@
               <a:buFont typeface="Wingdings" panose="05000000000000000000" pitchFamily="2" charset="2"/>
               <a:buChar char="ü"/>
             </a:pPr>
-            <a:r>
-              <a:rPr lang="en-CA" dirty="0"/>
-              <a:t>For the dashboard segment ,we have used Tableau Public and please click </a:t>
-            </a:r>
-            <a:r>
-              <a:rPr lang="en-CA" dirty="0">
-                <a:hlinkClick r:id="rId2"/>
-              </a:rPr>
-              <a:t>here</a:t>
-            </a:r>
-            <a:r>
-              <a:rPr lang="en-CA" dirty="0"/>
-              <a:t> view the interactive dashboard embed. </a:t>
-            </a:r>
+            <a:endParaRPr lang="en-CA" dirty="0"/>
           </a:p>
           <a:p>
             <a:pPr>
               <a:buFont typeface="Wingdings" panose="05000000000000000000" pitchFamily="2" charset="2"/>
               <a:buChar char="ü"/>
+            </a:pPr>
+            <a:r>
+              <a:rPr lang="en-CA" dirty="0"/>
+              <a:t>The tables and graphs reflect information from our dataset and allow the users to get a good overview of the factors leading to predict heart disease.</a:t>
+            </a:r>
+          </a:p>
+          <a:p>
+            <a:pPr marL="114300" indent="0">
+              <a:buNone/>
             </a:pPr>
             <a:endParaRPr lang="en-CA" dirty="0"/>
           </a:p>
@@ -19075,13 +19175,12 @@
             </a:pPr>
             <a:r>
               <a:rPr lang="en-CA" dirty="0"/>
-              <a:t>Prediction of number of people with heart disease will be the key element of the dashboard and how the leading factors interacts with the factors such as alcohol drinking, Diabetic, Kidney Disease and Asthma will be shown on the dashboard.</a:t>
+              <a:t>It will also show the connection with the binary and non binary features to the target variable. </a:t>
             </a:r>
           </a:p>
           <a:p>
-            <a:pPr>
-              <a:buFont typeface="Wingdings" panose="05000000000000000000" pitchFamily="2" charset="2"/>
-              <a:buChar char="ü"/>
+            <a:pPr marL="114300" indent="0">
+              <a:buNone/>
             </a:pPr>
             <a:endParaRPr lang="en-CA" dirty="0"/>
           </a:p>
@@ -19092,8 +19191,25 @@
             </a:pPr>
             <a:r>
               <a:rPr lang="en-CA" dirty="0"/>
-              <a:t>Some of the leading factors and how it relates with number of heart disease show as follows.  </a:t>
+              <a:t>Please click </a:t>
             </a:r>
+            <a:r>
+              <a:rPr lang="en-CA" dirty="0">
+                <a:hlinkClick r:id="rId2"/>
+              </a:rPr>
+              <a:t>here</a:t>
+            </a:r>
+            <a:r>
+              <a:rPr lang="en-CA" dirty="0"/>
+              <a:t> to view the interactive dashboard embed using tableau public. </a:t>
+            </a:r>
+          </a:p>
+          <a:p>
+            <a:pPr>
+              <a:buFont typeface="Wingdings" panose="05000000000000000000" pitchFamily="2" charset="2"/>
+              <a:buChar char="ü"/>
+            </a:pPr>
+            <a:endParaRPr lang="en-CA" dirty="0"/>
           </a:p>
         </p:txBody>
       </p:sp>
@@ -19101,231 +19217,6 @@
     <p:extLst>
       <p:ext uri="{BB962C8B-B14F-4D97-AF65-F5344CB8AC3E}">
         <p14:creationId xmlns:p14="http://schemas.microsoft.com/office/powerpoint/2010/main" val="819991842"/>
-      </p:ext>
-    </p:extLst>
-  </p:cSld>
-  <p:clrMapOvr>
-    <a:masterClrMapping/>
-  </p:clrMapOvr>
-</p:sld>
-</file>
-
-<file path=ppt/slides/slide22.xml><?xml version="1.0" encoding="utf-8"?>
-<p:sld xmlns:a="http://schemas.openxmlformats.org/drawingml/2006/main" xmlns:r="http://schemas.openxmlformats.org/officeDocument/2006/relationships" xmlns:p="http://schemas.openxmlformats.org/presentationml/2006/main">
-  <p:cSld>
-    <p:spTree>
-      <p:nvGrpSpPr>
-        <p:cNvPr id="1" name="Shape 124"/>
-        <p:cNvGrpSpPr/>
-        <p:nvPr/>
-      </p:nvGrpSpPr>
-      <p:grpSpPr>
-        <a:xfrm>
-          <a:off x="0" y="0"/>
-          <a:ext cx="0" cy="0"/>
-          <a:chOff x="0" y="0"/>
-          <a:chExt cx="0" cy="0"/>
-        </a:xfrm>
-      </p:grpSpPr>
-      <p:sp>
-        <p:nvSpPr>
-          <p:cNvPr id="126" name="Google Shape;126;p20"/>
-          <p:cNvSpPr txBox="1">
-            <a:spLocks noGrp="1"/>
-          </p:cNvSpPr>
-          <p:nvPr>
-            <p:ph type="body" idx="1"/>
-          </p:nvPr>
-        </p:nvSpPr>
-        <p:spPr>
-          <a:xfrm>
-            <a:off x="311700" y="1219200"/>
-            <a:ext cx="8520600" cy="2590800"/>
-          </a:xfrm>
-          <a:prstGeom prst="rect">
-            <a:avLst/>
-          </a:prstGeom>
-        </p:spPr>
-        <p:txBody>
-          <a:bodyPr spcFirstLastPara="1" wrap="square" lIns="91425" tIns="91425" rIns="91425" bIns="91425" anchor="t" anchorCtr="0">
-            <a:noAutofit/>
-          </a:bodyPr>
-          <a:lstStyle/>
-          <a:p>
-            <a:pPr marL="0" lvl="0" indent="0" algn="l" rtl="0">
-              <a:spcBef>
-                <a:spcPts val="1600"/>
-              </a:spcBef>
-              <a:spcAft>
-                <a:spcPts val="0"/>
-              </a:spcAft>
-              <a:buNone/>
-            </a:pPr>
-            <a:endParaRPr sz="2100" b="1" dirty="0">
-              <a:solidFill>
-                <a:schemeClr val="dk1"/>
-              </a:solidFill>
-            </a:endParaRPr>
-          </a:p>
-          <a:p>
-            <a:pPr marL="0" lvl="0" indent="0" algn="l" rtl="0">
-              <a:lnSpc>
-                <a:spcPct val="200000"/>
-              </a:lnSpc>
-              <a:spcBef>
-                <a:spcPts val="1600"/>
-              </a:spcBef>
-              <a:spcAft>
-                <a:spcPts val="1600"/>
-              </a:spcAft>
-              <a:buNone/>
-            </a:pPr>
-            <a:endParaRPr dirty="0"/>
-          </a:p>
-        </p:txBody>
-      </p:sp>
-      <p:pic>
-        <p:nvPicPr>
-          <p:cNvPr id="3" name="Picture 2">
-            <a:extLst>
-              <a:ext uri="{FF2B5EF4-FFF2-40B4-BE49-F238E27FC236}">
-                <a16:creationId xmlns:a16="http://schemas.microsoft.com/office/drawing/2014/main" id="{49C3BE9A-7BDA-4CBF-BDA3-11AC70C891E8}"/>
-              </a:ext>
-            </a:extLst>
-          </p:cNvPr>
-          <p:cNvPicPr>
-            <a:picLocks noChangeAspect="1"/>
-          </p:cNvPicPr>
-          <p:nvPr/>
-        </p:nvPicPr>
-        <p:blipFill>
-          <a:blip r:embed="rId3"/>
-          <a:stretch>
-            <a:fillRect/>
-          </a:stretch>
-        </p:blipFill>
-        <p:spPr>
-          <a:xfrm>
-            <a:off x="4789373" y="1910576"/>
-            <a:ext cx="4080308" cy="2943363"/>
-          </a:xfrm>
-          <a:prstGeom prst="rect">
-            <a:avLst/>
-          </a:prstGeom>
-        </p:spPr>
-      </p:pic>
-      <p:pic>
-        <p:nvPicPr>
-          <p:cNvPr id="4" name="Picture 3">
-            <a:extLst>
-              <a:ext uri="{FF2B5EF4-FFF2-40B4-BE49-F238E27FC236}">
-                <a16:creationId xmlns:a16="http://schemas.microsoft.com/office/drawing/2014/main" id="{BE07AEE8-FD82-4099-8FCF-B5D776BB1B10}"/>
-              </a:ext>
-            </a:extLst>
-          </p:cNvPr>
-          <p:cNvPicPr>
-            <a:picLocks noChangeAspect="1"/>
-          </p:cNvPicPr>
-          <p:nvPr/>
-        </p:nvPicPr>
-        <p:blipFill>
-          <a:blip r:embed="rId4"/>
-          <a:stretch>
-            <a:fillRect/>
-          </a:stretch>
-        </p:blipFill>
-        <p:spPr>
-          <a:xfrm>
-            <a:off x="327660" y="231021"/>
-            <a:ext cx="4145280" cy="3077174"/>
-          </a:xfrm>
-          <a:prstGeom prst="rect">
-            <a:avLst/>
-          </a:prstGeom>
-        </p:spPr>
-      </p:pic>
-      <p:sp>
-        <p:nvSpPr>
-          <p:cNvPr id="5" name="TextBox 4">
-            <a:extLst>
-              <a:ext uri="{FF2B5EF4-FFF2-40B4-BE49-F238E27FC236}">
-                <a16:creationId xmlns:a16="http://schemas.microsoft.com/office/drawing/2014/main" id="{00B2AAFB-3290-46E0-81A9-A014C4ED74F3}"/>
-              </a:ext>
-            </a:extLst>
-          </p:cNvPr>
-          <p:cNvSpPr txBox="1"/>
-          <p:nvPr/>
-        </p:nvSpPr>
-        <p:spPr>
-          <a:xfrm>
-            <a:off x="4869180" y="251460"/>
-            <a:ext cx="4038600" cy="1323439"/>
-          </a:xfrm>
-          <a:prstGeom prst="rect">
-            <a:avLst/>
-          </a:prstGeom>
-          <a:noFill/>
-        </p:spPr>
-        <p:txBody>
-          <a:bodyPr wrap="square" rtlCol="0">
-            <a:spAutoFit/>
-          </a:bodyPr>
-          <a:lstStyle/>
-          <a:p>
-            <a:r>
-              <a:rPr lang="en-CA" sz="1600" dirty="0">
-                <a:solidFill>
-                  <a:schemeClr val="tx1"/>
-                </a:solidFill>
-              </a:rPr>
-              <a:t>As per the general overview of factors it shows the total number of cases , gender breakdown of the number of people of the given dataset , smoking status , age category and the health status. </a:t>
-            </a:r>
-          </a:p>
-        </p:txBody>
-      </p:sp>
-      <p:sp>
-        <p:nvSpPr>
-          <p:cNvPr id="6" name="TextBox 5">
-            <a:extLst>
-              <a:ext uri="{FF2B5EF4-FFF2-40B4-BE49-F238E27FC236}">
-                <a16:creationId xmlns:a16="http://schemas.microsoft.com/office/drawing/2014/main" id="{FA330AFD-EBE9-4370-85E5-0935AD7471F1}"/>
-              </a:ext>
-            </a:extLst>
-          </p:cNvPr>
-          <p:cNvSpPr txBox="1"/>
-          <p:nvPr/>
-        </p:nvSpPr>
-        <p:spPr>
-          <a:xfrm>
-            <a:off x="342900" y="3467100"/>
-            <a:ext cx="4130040" cy="1569660"/>
-          </a:xfrm>
-          <a:prstGeom prst="rect">
-            <a:avLst/>
-          </a:prstGeom>
-          <a:noFill/>
-        </p:spPr>
-        <p:txBody>
-          <a:bodyPr wrap="square" rtlCol="0">
-            <a:spAutoFit/>
-          </a:bodyPr>
-          <a:lstStyle/>
-          <a:p>
-            <a:r>
-              <a:rPr lang="en-CA" sz="1600" dirty="0">
-                <a:solidFill>
-                  <a:schemeClr val="tx1"/>
-                </a:solidFill>
-              </a:rPr>
-              <a:t>As per the bar graphs it shows the no of persons with heart diseases who are using alcohol, who has kidney disease, who are a diabetic patient and who has Asthma. As per the graph it shows a less no of people with above conditions predict heart disease. </a:t>
-            </a:r>
-          </a:p>
-        </p:txBody>
-      </p:sp>
-    </p:spTree>
-    <p:extLst>
-      <p:ext uri="{BB962C8B-B14F-4D97-AF65-F5344CB8AC3E}">
-        <p14:creationId xmlns:p14="http://schemas.microsoft.com/office/powerpoint/2010/main" val="437393567"/>
       </p:ext>
     </p:extLst>
   </p:cSld>
@@ -21764,7 +21655,7 @@
           <p:nvPr>
             <p:extLst>
               <p:ext uri="{D42A27DB-BD31-4B8C-83A1-F6EECF244321}">
-                <p14:modId xmlns:p14="http://schemas.microsoft.com/office/powerpoint/2010/main" val="3612313353"/>
+                <p14:modId xmlns:p14="http://schemas.microsoft.com/office/powerpoint/2010/main" val="2768993373"/>
               </p:ext>
             </p:extLst>
           </p:nvPr>
@@ -21841,7 +21732,7 @@
                             </a:schemeClr>
                           </a:solidFill>
                         </a:rPr>
-                        <a:t>Linear Regression </a:t>
+                        <a:t>Logistic Regression </a:t>
                       </a:r>
                     </a:p>
                     <a:p>

</xml_diff>

<commit_message>
final update on the slides
</commit_message>
<xml_diff>
--- a/Final Project - Group 7.pptx
+++ b/Final Project - Group 7.pptx
@@ -1917,7 +1917,7 @@
       </dgm:t>
     </dgm:pt>
     <dgm:pt modelId="{E904B6EC-5E74-4D4E-8778-6C7A518260C0}">
-      <dgm:prSet phldrT="[Text]"/>
+      <dgm:prSet phldrT="[Text]" custT="1"/>
       <dgm:spPr>
         <a:solidFill>
           <a:schemeClr val="accent6">
@@ -1931,12 +1931,13 @@
         <a:lstStyle/>
         <a:p>
           <a:r>
-            <a:rPr lang="en-CA" dirty="0">
+            <a:rPr lang="en-CA" sz="1600" dirty="0">
               <a:solidFill>
                 <a:schemeClr val="bg1">
                   <a:lumMod val="50000"/>
                 </a:schemeClr>
               </a:solidFill>
+              <a:latin typeface="Average" panose="020B0604020202020204" charset="0"/>
             </a:rPr>
             <a:t>Importing libraries and files  for exploratory data analysis</a:t>
           </a:r>
@@ -2030,6 +2031,7 @@
                 <a:lumMod val="50000"/>
               </a:schemeClr>
             </a:solidFill>
+            <a:latin typeface="Average" panose="020B0604020202020204" charset="0"/>
           </a:endParaRPr>
         </a:p>
       </dgm:t>
@@ -2155,7 +2157,7 @@
       </dgm:t>
     </dgm:pt>
     <dgm:pt modelId="{F54F40D9-2775-41C7-AB52-B326FB48DA1F}">
-      <dgm:prSet/>
+      <dgm:prSet custT="1"/>
       <dgm:spPr>
         <a:solidFill>
           <a:schemeClr val="accent6">
@@ -2168,12 +2170,13 @@
         <a:bodyPr/>
         <a:lstStyle/>
         <a:p>
-          <a:endParaRPr lang="en-CA" dirty="0">
+          <a:endParaRPr lang="en-CA" sz="1600" dirty="0">
             <a:solidFill>
               <a:schemeClr val="bg1">
                 <a:lumMod val="50000"/>
               </a:schemeClr>
             </a:solidFill>
+            <a:latin typeface="Average" panose="020B0604020202020204" charset="0"/>
           </a:endParaRPr>
         </a:p>
       </dgm:t>
@@ -2201,7 +2204,7 @@
       </dgm:t>
     </dgm:pt>
     <dgm:pt modelId="{9612191B-9A9E-43F4-AF51-A8226C0BDCE5}">
-      <dgm:prSet/>
+      <dgm:prSet custT="1"/>
       <dgm:spPr>
         <a:solidFill>
           <a:schemeClr val="accent6">
@@ -2215,12 +2218,13 @@
         <a:lstStyle/>
         <a:p>
           <a:r>
-            <a:rPr lang="en-CA" dirty="0">
+            <a:rPr lang="en-CA" sz="1600" dirty="0">
               <a:solidFill>
                 <a:schemeClr val="bg1">
                   <a:lumMod val="50000"/>
                 </a:schemeClr>
               </a:solidFill>
+              <a:latin typeface="Average" panose="020B0604020202020204" charset="0"/>
             </a:rPr>
             <a:t>Creating data frame and checking  number of columns and rows.</a:t>
           </a:r>
@@ -2267,6 +2271,7 @@
                   <a:lumMod val="50000"/>
                 </a:schemeClr>
               </a:solidFill>
+              <a:latin typeface="Average" panose="020B0604020202020204" charset="0"/>
             </a:rPr>
             <a:t>Checking the data types.</a:t>
           </a:r>
@@ -2312,6 +2317,7 @@
                 <a:lumMod val="50000"/>
               </a:schemeClr>
             </a:solidFill>
+            <a:latin typeface="Average" panose="020B0604020202020204" charset="0"/>
           </a:endParaRPr>
         </a:p>
       </dgm:t>
@@ -2356,6 +2362,7 @@
                   <a:lumMod val="50000"/>
                 </a:schemeClr>
               </a:solidFill>
+              <a:latin typeface="Average" panose="020B0604020202020204" charset="0"/>
             </a:rPr>
             <a:t>Checking the data characters mistakes.</a:t>
           </a:r>
@@ -2401,6 +2408,7 @@
                 <a:lumMod val="50000"/>
               </a:schemeClr>
             </a:solidFill>
+            <a:latin typeface="Average" panose="020B0604020202020204" charset="0"/>
           </a:endParaRPr>
         </a:p>
       </dgm:t>
@@ -2445,6 +2453,7 @@
                   <a:lumMod val="50000"/>
                 </a:schemeClr>
               </a:solidFill>
+              <a:latin typeface="Average" panose="020B0604020202020204" charset="0"/>
             </a:rPr>
             <a:t>Checking the null values.</a:t>
           </a:r>
@@ -2490,6 +2499,7 @@
                 <a:lumMod val="50000"/>
               </a:schemeClr>
             </a:solidFill>
+            <a:latin typeface="Average" panose="020B0604020202020204" charset="0"/>
           </a:endParaRPr>
         </a:p>
       </dgm:t>
@@ -2534,6 +2544,7 @@
                   <a:lumMod val="50000"/>
                 </a:schemeClr>
               </a:solidFill>
+              <a:latin typeface="Average" panose="020B0604020202020204" charset="0"/>
             </a:rPr>
             <a:t>Checking and removing the duplicates.</a:t>
           </a:r>
@@ -2579,6 +2590,7 @@
                 <a:lumMod val="50000"/>
               </a:schemeClr>
             </a:solidFill>
+            <a:latin typeface="Average" panose="020B0604020202020204" charset="0"/>
           </a:endParaRPr>
         </a:p>
       </dgm:t>
@@ -2623,6 +2635,7 @@
                   <a:lumMod val="50000"/>
                 </a:schemeClr>
               </a:solidFill>
+              <a:latin typeface="Average" panose="020B0604020202020204" charset="0"/>
             </a:rPr>
             <a:t>Transforming the target variable.</a:t>
           </a:r>
@@ -2695,7 +2708,7 @@
       </dgm:t>
     </dgm:pt>
     <dgm:pt modelId="{52979EB2-3D17-4F79-AAF5-4D3316AB81E7}">
-      <dgm:prSet phldrT="[Text]"/>
+      <dgm:prSet phldrT="[Text]" custT="1"/>
       <dgm:spPr>
         <a:solidFill>
           <a:schemeClr val="accent6">
@@ -2708,7 +2721,7 @@
         <a:bodyPr/>
         <a:lstStyle/>
         <a:p>
-          <a:endParaRPr lang="en-CA" dirty="0">
+          <a:endParaRPr lang="en-CA" sz="1600" dirty="0">
             <a:solidFill>
               <a:schemeClr val="bg1">
                 <a:lumMod val="50000"/>
@@ -2768,6 +2781,7 @@
                   <a:lumMod val="50000"/>
                 </a:schemeClr>
               </a:solidFill>
+              <a:latin typeface="Average" panose="020B0604020202020204" charset="0"/>
             </a:rPr>
             <a:t>Loading data </a:t>
           </a:r>
@@ -2823,6 +2837,7 @@
                 <a:lumMod val="50000"/>
               </a:schemeClr>
             </a:solidFill>
+            <a:latin typeface="Average" panose="020B0604020202020204" charset="0"/>
           </a:endParaRPr>
         </a:p>
       </dgm:t>
@@ -2877,6 +2892,7 @@
                   <a:lumMod val="50000"/>
                 </a:schemeClr>
               </a:solidFill>
+              <a:latin typeface="Average" panose="020B0604020202020204" charset="0"/>
             </a:rPr>
             <a:t>Target variable visualization</a:t>
           </a:r>
@@ -2932,6 +2948,7 @@
                 <a:lumMod val="50000"/>
               </a:schemeClr>
             </a:solidFill>
+            <a:latin typeface="Average" panose="020B0604020202020204" charset="0"/>
           </a:endParaRPr>
         </a:p>
       </dgm:t>
@@ -2986,6 +3003,7 @@
                   <a:lumMod val="50000"/>
                 </a:schemeClr>
               </a:solidFill>
+              <a:latin typeface="Average" panose="020B0604020202020204" charset="0"/>
             </a:rPr>
             <a:t>Other variable against target variable visualizations.</a:t>
           </a:r>
@@ -3041,6 +3059,7 @@
                 <a:lumMod val="50000"/>
               </a:schemeClr>
             </a:solidFill>
+            <a:latin typeface="Average" panose="020B0604020202020204" charset="0"/>
           </a:endParaRPr>
         </a:p>
       </dgm:t>
@@ -3095,6 +3114,7 @@
                   <a:lumMod val="50000"/>
                 </a:schemeClr>
               </a:solidFill>
+              <a:latin typeface="Average" panose="020B0604020202020204" charset="0"/>
             </a:rPr>
             <a:t>Correlation Visualization. </a:t>
           </a:r>
@@ -3487,47 +3507,7 @@
                 </a:schemeClr>
               </a:solidFill>
             </a:rPr>
-            <a:t>Smoking, </a:t>
-          </a:r>
-          <a:r>
-            <a:rPr lang="en-CA" sz="1600" dirty="0" err="1">
-              <a:solidFill>
-                <a:schemeClr val="bg1">
-                  <a:lumMod val="50000"/>
-                </a:schemeClr>
-              </a:solidFill>
-            </a:rPr>
-            <a:t>AlcoholDrinking</a:t>
-          </a:r>
-          <a:r>
-            <a:rPr lang="en-CA" sz="1600" dirty="0">
-              <a:solidFill>
-                <a:schemeClr val="bg1">
-                  <a:lumMod val="50000"/>
-                </a:schemeClr>
-              </a:solidFill>
-            </a:rPr>
-            <a:t>, Stroke, Sex, </a:t>
-          </a:r>
-          <a:r>
-            <a:rPr lang="en-CA" sz="1600" dirty="0" err="1">
-              <a:solidFill>
-                <a:schemeClr val="bg1">
-                  <a:lumMod val="50000"/>
-                </a:schemeClr>
-              </a:solidFill>
-            </a:rPr>
-            <a:t>PhysicalActivity</a:t>
-          </a:r>
-          <a:r>
-            <a:rPr lang="en-CA" sz="1600" dirty="0">
-              <a:solidFill>
-                <a:schemeClr val="bg1">
-                  <a:lumMod val="50000"/>
-                </a:schemeClr>
-              </a:solidFill>
-            </a:rPr>
-            <a:t>, </a:t>
+            <a:t>Smoking, AlcoholDrinking, Stroke, Sex, PhysicalActivity, </a:t>
           </a:r>
         </a:p>
         <a:p>
@@ -3543,65 +3523,8 @@
                 </a:schemeClr>
               </a:solidFill>
             </a:rPr>
-            <a:t>Asthma, </a:t>
+            <a:t>Asthma, KidneyDisease, SkinCancer, Diffwalking</a:t>
           </a:r>
-          <a:r>
-            <a:rPr lang="en-CA" sz="1600" dirty="0" err="1">
-              <a:solidFill>
-                <a:schemeClr val="bg1">
-                  <a:lumMod val="50000"/>
-                </a:schemeClr>
-              </a:solidFill>
-            </a:rPr>
-            <a:t>KidneyDisease</a:t>
-          </a:r>
-          <a:r>
-            <a:rPr lang="en-CA" sz="1600" dirty="0">
-              <a:solidFill>
-                <a:schemeClr val="bg1">
-                  <a:lumMod val="50000"/>
-                </a:schemeClr>
-              </a:solidFill>
-            </a:rPr>
-            <a:t>, </a:t>
-          </a:r>
-          <a:r>
-            <a:rPr lang="en-CA" sz="1600" dirty="0" err="1">
-              <a:solidFill>
-                <a:schemeClr val="bg1">
-                  <a:lumMod val="50000"/>
-                </a:schemeClr>
-              </a:solidFill>
-            </a:rPr>
-            <a:t>SkinCancer</a:t>
-          </a:r>
-          <a:r>
-            <a:rPr lang="en-CA" sz="1600" dirty="0">
-              <a:solidFill>
-                <a:schemeClr val="bg1">
-                  <a:lumMod val="50000"/>
-                </a:schemeClr>
-              </a:solidFill>
-            </a:rPr>
-            <a:t>, </a:t>
-          </a:r>
-          <a:r>
-            <a:rPr lang="en-CA" sz="1600" dirty="0" err="1">
-              <a:solidFill>
-                <a:schemeClr val="bg1">
-                  <a:lumMod val="50000"/>
-                </a:schemeClr>
-              </a:solidFill>
-            </a:rPr>
-            <a:t>Diffwalking</a:t>
-          </a:r>
-          <a:endParaRPr lang="en-CA" sz="1600" dirty="0">
-            <a:solidFill>
-              <a:schemeClr val="bg1">
-                <a:lumMod val="50000"/>
-              </a:schemeClr>
-            </a:solidFill>
-          </a:endParaRPr>
         </a:p>
       </dgm:t>
     </dgm:pt>
@@ -3658,18 +3581,10 @@
                 </a:schemeClr>
               </a:solidFill>
             </a:rPr>
-            <a:t>BMI, </a:t>
+            <a:t>BMI, PhysicalHealth,</a:t>
           </a:r>
-          <a:r>
-            <a:rPr lang="en-CA" sz="1600" b="0" dirty="0" err="1">
-              <a:solidFill>
-                <a:schemeClr val="bg1">
-                  <a:lumMod val="50000"/>
-                </a:schemeClr>
-              </a:solidFill>
-            </a:rPr>
-            <a:t>PhysicalHealth</a:t>
-          </a:r>
+        </a:p>
+        <a:p>
           <a:r>
             <a:rPr lang="en-CA" sz="1600" b="0" dirty="0">
               <a:solidFill>
@@ -3678,20 +3593,10 @@
                 </a:schemeClr>
               </a:solidFill>
             </a:rPr>
-            <a:t>,</a:t>
+            <a:t>MentalHealth,</a:t>
           </a:r>
         </a:p>
         <a:p>
-          <a:r>
-            <a:rPr lang="en-CA" sz="1600" b="0" dirty="0" err="1">
-              <a:solidFill>
-                <a:schemeClr val="bg1">
-                  <a:lumMod val="50000"/>
-                </a:schemeClr>
-              </a:solidFill>
-            </a:rPr>
-            <a:t>MentalHealth</a:t>
-          </a:r>
           <a:r>
             <a:rPr lang="en-CA" sz="1600" b="0" dirty="0">
               <a:solidFill>
@@ -3700,20 +3605,10 @@
                 </a:schemeClr>
               </a:solidFill>
             </a:rPr>
-            <a:t>,</a:t>
+            <a:t>AgeCategory,</a:t>
           </a:r>
         </a:p>
         <a:p>
-          <a:r>
-            <a:rPr lang="en-CA" sz="1600" b="0" dirty="0" err="1">
-              <a:solidFill>
-                <a:schemeClr val="bg1">
-                  <a:lumMod val="50000"/>
-                </a:schemeClr>
-              </a:solidFill>
-            </a:rPr>
-            <a:t>AgeCategory</a:t>
-          </a:r>
           <a:r>
             <a:rPr lang="en-CA" sz="1600" b="0" dirty="0">
               <a:solidFill>
@@ -3722,29 +3617,7 @@
                 </a:schemeClr>
               </a:solidFill>
             </a:rPr>
-            <a:t>,</a:t>
-          </a:r>
-        </a:p>
-        <a:p>
-          <a:r>
-            <a:rPr lang="en-CA" sz="1600" b="0" dirty="0" err="1">
-              <a:solidFill>
-                <a:schemeClr val="bg1">
-                  <a:lumMod val="50000"/>
-                </a:schemeClr>
-              </a:solidFill>
-            </a:rPr>
-            <a:t>GeneralHealth</a:t>
-          </a:r>
-          <a:r>
-            <a:rPr lang="en-CA" sz="1600" b="0" dirty="0">
-              <a:solidFill>
-                <a:schemeClr val="bg1">
-                  <a:lumMod val="50000"/>
-                </a:schemeClr>
-              </a:solidFill>
-            </a:rPr>
-            <a:t>,</a:t>
+            <a:t>GeneralHealth,</a:t>
           </a:r>
         </a:p>
         <a:p>
@@ -3761,16 +3634,6 @@
         </a:p>
         <a:p>
           <a:r>
-            <a:rPr lang="en-CA" sz="1600" b="0" dirty="0" err="1">
-              <a:solidFill>
-                <a:schemeClr val="bg1">
-                  <a:lumMod val="50000"/>
-                </a:schemeClr>
-              </a:solidFill>
-            </a:rPr>
-            <a:t>Sleeptime</a:t>
-          </a:r>
-          <a:r>
             <a:rPr lang="en-CA" sz="1600" b="0" dirty="0">
               <a:solidFill>
                 <a:schemeClr val="bg1">
@@ -3778,7 +3641,7 @@
                 </a:schemeClr>
               </a:solidFill>
             </a:rPr>
-            <a:t>, Race</a:t>
+            <a:t>Sleeptime, Race</a:t>
           </a:r>
         </a:p>
         <a:p>
@@ -4206,8 +4069,8 @@
       </dsp:nvSpPr>
       <dsp:spPr>
         <a:xfrm>
-          <a:off x="2662" y="248329"/>
-          <a:ext cx="2596422" cy="526776"/>
+          <a:off x="2662" y="48832"/>
+          <a:ext cx="2596422" cy="551076"/>
         </a:xfrm>
         <a:prstGeom prst="rect">
           <a:avLst/>
@@ -4248,12 +4111,12 @@
         </a:fontRef>
       </dsp:style>
       <dsp:txBody>
-        <a:bodyPr spcFirstLastPara="0" vert="horz" wrap="square" lIns="106680" tIns="60960" rIns="106680" bIns="60960" numCol="1" spcCol="1270" anchor="ctr" anchorCtr="0">
+        <a:bodyPr spcFirstLastPara="0" vert="horz" wrap="square" lIns="113792" tIns="65024" rIns="113792" bIns="65024" numCol="1" spcCol="1270" anchor="ctr" anchorCtr="0">
           <a:noAutofit/>
         </a:bodyPr>
         <a:lstStyle/>
         <a:p>
-          <a:pPr marL="0" lvl="0" indent="0" algn="ctr" defTabSz="666750">
+          <a:pPr marL="0" lvl="0" indent="0" algn="ctr" defTabSz="711200">
             <a:lnSpc>
               <a:spcPct val="90000"/>
             </a:lnSpc>
@@ -4266,7 +4129,7 @@
             <a:buNone/>
           </a:pPr>
           <a:r>
-            <a:rPr lang="en-CA" sz="1500" b="1" kern="1200" dirty="0">
+            <a:rPr lang="en-CA" sz="1600" b="1" kern="1200" dirty="0">
               <a:solidFill>
                 <a:schemeClr val="tx1"/>
               </a:solidFill>
@@ -4276,8 +4139,8 @@
         </a:p>
       </dsp:txBody>
       <dsp:txXfrm>
-        <a:off x="2662" y="248329"/>
-        <a:ext cx="2596422" cy="526776"/>
+        <a:off x="2662" y="48832"/>
+        <a:ext cx="2596422" cy="551076"/>
       </dsp:txXfrm>
     </dsp:sp>
     <dsp:sp modelId="{1115D212-6374-4E47-8B2E-6B883099010E}">
@@ -4287,8 +4150,8 @@
       </dsp:nvSpPr>
       <dsp:spPr>
         <a:xfrm>
-          <a:off x="2662" y="775105"/>
-          <a:ext cx="2596422" cy="3314587"/>
+          <a:off x="2662" y="599909"/>
+          <a:ext cx="2596422" cy="3689280"/>
         </a:xfrm>
         <a:prstGeom prst="rect">
           <a:avLst/>
@@ -4327,12 +4190,12 @@
         <a:fontRef idx="minor"/>
       </dsp:style>
       <dsp:txBody>
-        <a:bodyPr spcFirstLastPara="0" vert="horz" wrap="square" lIns="80010" tIns="80010" rIns="106680" bIns="120015" numCol="1" spcCol="1270" anchor="t" anchorCtr="0">
+        <a:bodyPr spcFirstLastPara="0" vert="horz" wrap="square" lIns="85344" tIns="85344" rIns="113792" bIns="128016" numCol="1" spcCol="1270" anchor="t" anchorCtr="0">
           <a:noAutofit/>
         </a:bodyPr>
         <a:lstStyle/>
         <a:p>
-          <a:pPr marL="114300" lvl="1" indent="-114300" algn="l" defTabSz="666750">
+          <a:pPr marL="171450" lvl="1" indent="-171450" algn="l" defTabSz="711200">
             <a:lnSpc>
               <a:spcPct val="90000"/>
             </a:lnSpc>
@@ -4344,7 +4207,7 @@
             </a:spcAft>
             <a:buChar char="•"/>
           </a:pPr>
-          <a:endParaRPr lang="en-CA" sz="1500" kern="1200" dirty="0">
+          <a:endParaRPr lang="en-CA" sz="1600" kern="1200" dirty="0">
             <a:solidFill>
               <a:schemeClr val="bg1">
                 <a:lumMod val="50000"/>
@@ -4353,7 +4216,7 @@
           </a:endParaRPr>
         </a:p>
         <a:p>
-          <a:pPr marL="114300" lvl="1" indent="-114300" algn="l" defTabSz="666750">
+          <a:pPr marL="171450" lvl="1" indent="-171450" algn="l" defTabSz="711200">
             <a:lnSpc>
               <a:spcPct val="90000"/>
             </a:lnSpc>
@@ -4366,18 +4229,19 @@
             <a:buChar char="•"/>
           </a:pPr>
           <a:r>
-            <a:rPr lang="en-CA" sz="1500" kern="1200" dirty="0">
+            <a:rPr lang="en-CA" sz="1600" kern="1200" dirty="0">
               <a:solidFill>
                 <a:schemeClr val="bg1">
                   <a:lumMod val="50000"/>
                 </a:schemeClr>
               </a:solidFill>
+              <a:latin typeface="Average" panose="020B0604020202020204" charset="0"/>
             </a:rPr>
             <a:t>Importing libraries and files  for exploratory data analysis</a:t>
           </a:r>
         </a:p>
         <a:p>
-          <a:pPr marL="114300" lvl="1" indent="-114300" algn="l" defTabSz="666750">
+          <a:pPr marL="171450" lvl="1" indent="-171450" algn="l" defTabSz="711200">
             <a:lnSpc>
               <a:spcPct val="90000"/>
             </a:lnSpc>
@@ -4389,16 +4253,17 @@
             </a:spcAft>
             <a:buChar char="•"/>
           </a:pPr>
-          <a:endParaRPr lang="en-CA" sz="1500" kern="1200" dirty="0">
+          <a:endParaRPr lang="en-CA" sz="1600" kern="1200" dirty="0">
             <a:solidFill>
               <a:schemeClr val="bg1">
                 <a:lumMod val="50000"/>
               </a:schemeClr>
             </a:solidFill>
+            <a:latin typeface="Average" panose="020B0604020202020204" charset="0"/>
           </a:endParaRPr>
         </a:p>
         <a:p>
-          <a:pPr marL="114300" lvl="1" indent="-114300" algn="l" defTabSz="666750">
+          <a:pPr marL="171450" lvl="1" indent="-171450" algn="l" defTabSz="711200">
             <a:lnSpc>
               <a:spcPct val="90000"/>
             </a:lnSpc>
@@ -4411,20 +4276,21 @@
             <a:buChar char="•"/>
           </a:pPr>
           <a:r>
-            <a:rPr lang="en-CA" sz="1500" kern="1200" dirty="0">
+            <a:rPr lang="en-CA" sz="1600" kern="1200" dirty="0">
               <a:solidFill>
                 <a:schemeClr val="bg1">
                   <a:lumMod val="50000"/>
                 </a:schemeClr>
               </a:solidFill>
+              <a:latin typeface="Average" panose="020B0604020202020204" charset="0"/>
             </a:rPr>
             <a:t>Creating data frame and checking  number of columns and rows.</a:t>
           </a:r>
         </a:p>
       </dsp:txBody>
       <dsp:txXfrm>
-        <a:off x="2662" y="775105"/>
-        <a:ext cx="2596422" cy="3314587"/>
+        <a:off x="2662" y="599909"/>
+        <a:ext cx="2596422" cy="3689280"/>
       </dsp:txXfrm>
     </dsp:sp>
     <dsp:sp modelId="{CE95A4BA-D168-475B-89C8-E1F9BEB2E778}">
@@ -4434,8 +4300,8 @@
       </dsp:nvSpPr>
       <dsp:spPr>
         <a:xfrm>
-          <a:off x="2962584" y="248329"/>
-          <a:ext cx="2596422" cy="526776"/>
+          <a:off x="2962584" y="48832"/>
+          <a:ext cx="2596422" cy="551076"/>
         </a:xfrm>
         <a:prstGeom prst="rect">
           <a:avLst/>
@@ -4476,12 +4342,12 @@
         </a:fontRef>
       </dsp:style>
       <dsp:txBody>
-        <a:bodyPr spcFirstLastPara="0" vert="horz" wrap="square" lIns="106680" tIns="60960" rIns="106680" bIns="60960" numCol="1" spcCol="1270" anchor="ctr" anchorCtr="0">
+        <a:bodyPr spcFirstLastPara="0" vert="horz" wrap="square" lIns="113792" tIns="65024" rIns="113792" bIns="65024" numCol="1" spcCol="1270" anchor="ctr" anchorCtr="0">
           <a:noAutofit/>
         </a:bodyPr>
         <a:lstStyle/>
         <a:p>
-          <a:pPr marL="0" lvl="0" indent="0" algn="ctr" defTabSz="666750">
+          <a:pPr marL="0" lvl="0" indent="0" algn="ctr" defTabSz="711200">
             <a:lnSpc>
               <a:spcPct val="90000"/>
             </a:lnSpc>
@@ -4494,7 +4360,7 @@
             <a:buNone/>
           </a:pPr>
           <a:r>
-            <a:rPr lang="en-CA" sz="1500" b="1" kern="1200" dirty="0">
+            <a:rPr lang="en-CA" sz="1600" b="1" kern="1200" dirty="0">
               <a:solidFill>
                 <a:schemeClr val="tx1"/>
               </a:solidFill>
@@ -4504,8 +4370,8 @@
         </a:p>
       </dsp:txBody>
       <dsp:txXfrm>
-        <a:off x="2962584" y="248329"/>
-        <a:ext cx="2596422" cy="526776"/>
+        <a:off x="2962584" y="48832"/>
+        <a:ext cx="2596422" cy="551076"/>
       </dsp:txXfrm>
     </dsp:sp>
     <dsp:sp modelId="{0D002F2B-9D25-474F-9E02-4EA1639D9204}">
@@ -4515,8 +4381,8 @@
       </dsp:nvSpPr>
       <dsp:spPr>
         <a:xfrm>
-          <a:off x="2962584" y="775105"/>
-          <a:ext cx="2596422" cy="3314587"/>
+          <a:off x="2962584" y="599909"/>
+          <a:ext cx="2596422" cy="3689280"/>
         </a:xfrm>
         <a:prstGeom prst="rect">
           <a:avLst/>
@@ -4556,12 +4422,12 @@
         <a:fontRef idx="minor"/>
       </dsp:style>
       <dsp:txBody>
-        <a:bodyPr spcFirstLastPara="0" vert="horz" wrap="square" lIns="80010" tIns="80010" rIns="106680" bIns="120015" numCol="1" spcCol="1270" anchor="t" anchorCtr="0">
+        <a:bodyPr spcFirstLastPara="0" vert="horz" wrap="square" lIns="85344" tIns="85344" rIns="113792" bIns="128016" numCol="1" spcCol="1270" anchor="t" anchorCtr="0">
           <a:noAutofit/>
         </a:bodyPr>
         <a:lstStyle/>
         <a:p>
-          <a:pPr marL="114300" lvl="1" indent="-114300" algn="l" defTabSz="666750">
+          <a:pPr marL="171450" lvl="1" indent="-171450" algn="l" defTabSz="711200">
             <a:lnSpc>
               <a:spcPct val="90000"/>
             </a:lnSpc>
@@ -4574,16 +4440,17 @@
             <a:buFont typeface="Arial" panose="020B0604020202020204" pitchFamily="34" charset="0"/>
             <a:buNone/>
           </a:pPr>
-          <a:endParaRPr lang="en-CA" sz="1500" kern="1200" dirty="0">
+          <a:endParaRPr lang="en-CA" sz="1600" kern="1200" dirty="0">
             <a:solidFill>
               <a:schemeClr val="bg1">
                 <a:lumMod val="50000"/>
               </a:schemeClr>
             </a:solidFill>
+            <a:latin typeface="Average" panose="020B0604020202020204" charset="0"/>
           </a:endParaRPr>
         </a:p>
         <a:p>
-          <a:pPr marL="114300" lvl="1" indent="-114300" algn="l" defTabSz="666750">
+          <a:pPr marL="171450" lvl="1" indent="-171450" algn="l" defTabSz="711200">
             <a:lnSpc>
               <a:spcPct val="90000"/>
             </a:lnSpc>
@@ -4597,18 +4464,19 @@
             <a:buChar char="•"/>
           </a:pPr>
           <a:r>
-            <a:rPr lang="en-CA" sz="1500" kern="1200" dirty="0">
+            <a:rPr lang="en-CA" sz="1600" kern="1200" dirty="0">
               <a:solidFill>
                 <a:schemeClr val="bg1">
                   <a:lumMod val="50000"/>
                 </a:schemeClr>
               </a:solidFill>
+              <a:latin typeface="Average" panose="020B0604020202020204" charset="0"/>
             </a:rPr>
             <a:t>Checking the data types.</a:t>
           </a:r>
         </a:p>
         <a:p>
-          <a:pPr marL="114300" lvl="1" indent="-114300" algn="l" defTabSz="666750">
+          <a:pPr marL="171450" lvl="1" indent="-171450" algn="l" defTabSz="711200">
             <a:lnSpc>
               <a:spcPct val="90000"/>
             </a:lnSpc>
@@ -4621,16 +4489,17 @@
             <a:buFont typeface="Arial" panose="020B0604020202020204" pitchFamily="34" charset="0"/>
             <a:buChar char="•"/>
           </a:pPr>
-          <a:endParaRPr lang="en-CA" sz="1500" kern="1200" dirty="0">
+          <a:endParaRPr lang="en-CA" sz="1600" kern="1200" dirty="0">
             <a:solidFill>
               <a:schemeClr val="bg1">
                 <a:lumMod val="50000"/>
               </a:schemeClr>
             </a:solidFill>
+            <a:latin typeface="Average" panose="020B0604020202020204" charset="0"/>
           </a:endParaRPr>
         </a:p>
         <a:p>
-          <a:pPr marL="114300" lvl="1" indent="-114300" algn="l" defTabSz="666750">
+          <a:pPr marL="171450" lvl="1" indent="-171450" algn="l" defTabSz="711200">
             <a:lnSpc>
               <a:spcPct val="90000"/>
             </a:lnSpc>
@@ -4644,18 +4513,19 @@
             <a:buChar char="•"/>
           </a:pPr>
           <a:r>
-            <a:rPr lang="en-CA" sz="1500" kern="1200" dirty="0">
+            <a:rPr lang="en-CA" sz="1600" kern="1200" dirty="0">
               <a:solidFill>
                 <a:schemeClr val="bg1">
                   <a:lumMod val="50000"/>
                 </a:schemeClr>
               </a:solidFill>
+              <a:latin typeface="Average" panose="020B0604020202020204" charset="0"/>
             </a:rPr>
             <a:t>Checking the data characters mistakes.</a:t>
           </a:r>
         </a:p>
         <a:p>
-          <a:pPr marL="114300" lvl="1" indent="-114300" algn="l" defTabSz="666750">
+          <a:pPr marL="171450" lvl="1" indent="-171450" algn="l" defTabSz="711200">
             <a:lnSpc>
               <a:spcPct val="90000"/>
             </a:lnSpc>
@@ -4668,16 +4538,17 @@
             <a:buFont typeface="Arial" panose="020B0604020202020204" pitchFamily="34" charset="0"/>
             <a:buChar char="•"/>
           </a:pPr>
-          <a:endParaRPr lang="en-CA" sz="1500" kern="1200" dirty="0">
+          <a:endParaRPr lang="en-CA" sz="1600" kern="1200" dirty="0">
             <a:solidFill>
               <a:schemeClr val="bg1">
                 <a:lumMod val="50000"/>
               </a:schemeClr>
             </a:solidFill>
+            <a:latin typeface="Average" panose="020B0604020202020204" charset="0"/>
           </a:endParaRPr>
         </a:p>
         <a:p>
-          <a:pPr marL="114300" lvl="1" indent="-114300" algn="l" defTabSz="666750">
+          <a:pPr marL="171450" lvl="1" indent="-171450" algn="l" defTabSz="711200">
             <a:lnSpc>
               <a:spcPct val="90000"/>
             </a:lnSpc>
@@ -4691,18 +4562,19 @@
             <a:buChar char="•"/>
           </a:pPr>
           <a:r>
-            <a:rPr lang="en-CA" sz="1500" kern="1200" dirty="0">
+            <a:rPr lang="en-CA" sz="1600" kern="1200" dirty="0">
               <a:solidFill>
                 <a:schemeClr val="bg1">
                   <a:lumMod val="50000"/>
                 </a:schemeClr>
               </a:solidFill>
+              <a:latin typeface="Average" panose="020B0604020202020204" charset="0"/>
             </a:rPr>
             <a:t>Checking the null values.</a:t>
           </a:r>
         </a:p>
         <a:p>
-          <a:pPr marL="114300" lvl="1" indent="-114300" algn="l" defTabSz="666750">
+          <a:pPr marL="171450" lvl="1" indent="-171450" algn="l" defTabSz="711200">
             <a:lnSpc>
               <a:spcPct val="90000"/>
             </a:lnSpc>
@@ -4715,16 +4587,17 @@
             <a:buFont typeface="Arial" panose="020B0604020202020204" pitchFamily="34" charset="0"/>
             <a:buChar char="•"/>
           </a:pPr>
-          <a:endParaRPr lang="en-CA" sz="1500" kern="1200" dirty="0">
+          <a:endParaRPr lang="en-CA" sz="1600" kern="1200" dirty="0">
             <a:solidFill>
               <a:schemeClr val="bg1">
                 <a:lumMod val="50000"/>
               </a:schemeClr>
             </a:solidFill>
+            <a:latin typeface="Average" panose="020B0604020202020204" charset="0"/>
           </a:endParaRPr>
         </a:p>
         <a:p>
-          <a:pPr marL="114300" lvl="1" indent="-114300" algn="l" defTabSz="666750">
+          <a:pPr marL="171450" lvl="1" indent="-171450" algn="l" defTabSz="711200">
             <a:lnSpc>
               <a:spcPct val="90000"/>
             </a:lnSpc>
@@ -4738,18 +4611,19 @@
             <a:buChar char="•"/>
           </a:pPr>
           <a:r>
-            <a:rPr lang="en-CA" sz="1500" kern="1200" dirty="0">
+            <a:rPr lang="en-CA" sz="1600" kern="1200" dirty="0">
               <a:solidFill>
                 <a:schemeClr val="bg1">
                   <a:lumMod val="50000"/>
                 </a:schemeClr>
               </a:solidFill>
+              <a:latin typeface="Average" panose="020B0604020202020204" charset="0"/>
             </a:rPr>
             <a:t>Checking and removing the duplicates.</a:t>
           </a:r>
         </a:p>
         <a:p>
-          <a:pPr marL="114300" lvl="1" indent="-114300" algn="l" defTabSz="666750">
+          <a:pPr marL="171450" lvl="1" indent="-171450" algn="l" defTabSz="711200">
             <a:lnSpc>
               <a:spcPct val="90000"/>
             </a:lnSpc>
@@ -4762,16 +4636,17 @@
             <a:buFont typeface="Arial" panose="020B0604020202020204" pitchFamily="34" charset="0"/>
             <a:buChar char="•"/>
           </a:pPr>
-          <a:endParaRPr lang="en-CA" sz="1500" kern="1200" dirty="0">
+          <a:endParaRPr lang="en-CA" sz="1600" kern="1200" dirty="0">
             <a:solidFill>
               <a:schemeClr val="bg1">
                 <a:lumMod val="50000"/>
               </a:schemeClr>
             </a:solidFill>
+            <a:latin typeface="Average" panose="020B0604020202020204" charset="0"/>
           </a:endParaRPr>
         </a:p>
         <a:p>
-          <a:pPr marL="114300" lvl="1" indent="-114300" algn="l" defTabSz="666750">
+          <a:pPr marL="171450" lvl="1" indent="-171450" algn="l" defTabSz="711200">
             <a:lnSpc>
               <a:spcPct val="90000"/>
             </a:lnSpc>
@@ -4785,18 +4660,19 @@
             <a:buChar char="•"/>
           </a:pPr>
           <a:r>
-            <a:rPr lang="en-CA" sz="1500" kern="1200" dirty="0">
+            <a:rPr lang="en-CA" sz="1600" kern="1200" dirty="0">
               <a:solidFill>
                 <a:schemeClr val="bg1">
                   <a:lumMod val="50000"/>
                 </a:schemeClr>
               </a:solidFill>
+              <a:latin typeface="Average" panose="020B0604020202020204" charset="0"/>
             </a:rPr>
             <a:t>Transforming the target variable.</a:t>
           </a:r>
         </a:p>
         <a:p>
-          <a:pPr marL="114300" lvl="1" indent="-114300" algn="l" defTabSz="666750">
+          <a:pPr marL="171450" lvl="1" indent="-171450" algn="l" defTabSz="711200">
             <a:lnSpc>
               <a:spcPct val="90000"/>
             </a:lnSpc>
@@ -4809,7 +4685,7 @@
             <a:buFont typeface="Arial" panose="020B0604020202020204" pitchFamily="34" charset="0"/>
             <a:buNone/>
           </a:pPr>
-          <a:endParaRPr lang="en-CA" sz="1500" kern="1200" dirty="0">
+          <a:endParaRPr lang="en-CA" sz="1600" kern="1200" dirty="0">
             <a:solidFill>
               <a:schemeClr val="bg1">
                 <a:lumMod val="50000"/>
@@ -4819,8 +4695,8 @@
         </a:p>
       </dsp:txBody>
       <dsp:txXfrm>
-        <a:off x="2962584" y="775105"/>
-        <a:ext cx="2596422" cy="3314587"/>
+        <a:off x="2962584" y="599909"/>
+        <a:ext cx="2596422" cy="3689280"/>
       </dsp:txXfrm>
     </dsp:sp>
     <dsp:sp modelId="{5020AC71-D03E-4121-932F-F2BE87AC3275}">
@@ -4830,8 +4706,8 @@
       </dsp:nvSpPr>
       <dsp:spPr>
         <a:xfrm>
-          <a:off x="5922506" y="248329"/>
-          <a:ext cx="2596422" cy="526776"/>
+          <a:off x="5922506" y="48832"/>
+          <a:ext cx="2596422" cy="551076"/>
         </a:xfrm>
         <a:prstGeom prst="rect">
           <a:avLst/>
@@ -4872,12 +4748,12 @@
         </a:fontRef>
       </dsp:style>
       <dsp:txBody>
-        <a:bodyPr spcFirstLastPara="0" vert="horz" wrap="square" lIns="106680" tIns="60960" rIns="106680" bIns="60960" numCol="1" spcCol="1270" anchor="ctr" anchorCtr="0">
+        <a:bodyPr spcFirstLastPara="0" vert="horz" wrap="square" lIns="113792" tIns="65024" rIns="113792" bIns="65024" numCol="1" spcCol="1270" anchor="ctr" anchorCtr="0">
           <a:noAutofit/>
         </a:bodyPr>
         <a:lstStyle/>
         <a:p>
-          <a:pPr marL="0" lvl="0" indent="0" algn="ctr" defTabSz="666750">
+          <a:pPr marL="0" lvl="0" indent="0" algn="ctr" defTabSz="711200">
             <a:lnSpc>
               <a:spcPct val="90000"/>
             </a:lnSpc>
@@ -4890,7 +4766,7 @@
             <a:buNone/>
           </a:pPr>
           <a:r>
-            <a:rPr lang="en-CA" sz="1500" b="1" kern="1200" dirty="0">
+            <a:rPr lang="en-CA" sz="1600" b="1" kern="1200" dirty="0">
               <a:solidFill>
                 <a:schemeClr val="tx1"/>
               </a:solidFill>
@@ -4900,8 +4776,8 @@
         </a:p>
       </dsp:txBody>
       <dsp:txXfrm>
-        <a:off x="5922506" y="248329"/>
-        <a:ext cx="2596422" cy="526776"/>
+        <a:off x="5922506" y="48832"/>
+        <a:ext cx="2596422" cy="551076"/>
       </dsp:txXfrm>
     </dsp:sp>
     <dsp:sp modelId="{A6AFB27F-B30D-4C28-B480-4B85E71650B8}">
@@ -4911,8 +4787,8 @@
       </dsp:nvSpPr>
       <dsp:spPr>
         <a:xfrm>
-          <a:off x="5922506" y="775105"/>
-          <a:ext cx="2596422" cy="3314587"/>
+          <a:off x="5922506" y="599909"/>
+          <a:ext cx="2596422" cy="3689280"/>
         </a:xfrm>
         <a:prstGeom prst="rect">
           <a:avLst/>
@@ -4947,12 +4823,12 @@
         <a:fontRef idx="minor"/>
       </dsp:style>
       <dsp:txBody>
-        <a:bodyPr spcFirstLastPara="0" vert="horz" wrap="square" lIns="80010" tIns="80010" rIns="106680" bIns="120015" numCol="1" spcCol="1270" anchor="t" anchorCtr="0">
+        <a:bodyPr spcFirstLastPara="0" vert="horz" wrap="square" lIns="85344" tIns="85344" rIns="113792" bIns="128016" numCol="1" spcCol="1270" anchor="t" anchorCtr="0">
           <a:noAutofit/>
         </a:bodyPr>
         <a:lstStyle/>
         <a:p>
-          <a:pPr marL="114300" lvl="1" indent="-114300" algn="l" defTabSz="666750">
+          <a:pPr marL="171450" lvl="1" indent="-171450" algn="l" defTabSz="711200">
             <a:lnSpc>
               <a:spcPct val="90000"/>
             </a:lnSpc>
@@ -4965,7 +4841,7 @@
             <a:buFont typeface="Arial" panose="020B0604020202020204" pitchFamily="34" charset="0"/>
             <a:buChar char="•"/>
           </a:pPr>
-          <a:endParaRPr lang="en-CA" sz="1500" kern="1200" dirty="0">
+          <a:endParaRPr lang="en-CA" sz="1600" kern="1200" dirty="0">
             <a:solidFill>
               <a:schemeClr val="bg1">
                 <a:lumMod val="50000"/>
@@ -4974,7 +4850,7 @@
           </a:endParaRPr>
         </a:p>
         <a:p>
-          <a:pPr marL="114300" lvl="1" indent="-114300" algn="l" defTabSz="666750">
+          <a:pPr marL="171450" lvl="1" indent="-171450" algn="l" defTabSz="711200">
             <a:lnSpc>
               <a:spcPct val="90000"/>
             </a:lnSpc>
@@ -4988,18 +4864,19 @@
             <a:buChar char="•"/>
           </a:pPr>
           <a:r>
-            <a:rPr lang="en-CA" sz="1500" kern="1200" dirty="0">
+            <a:rPr lang="en-CA" sz="1600" kern="1200" dirty="0">
               <a:solidFill>
                 <a:schemeClr val="bg1">
                   <a:lumMod val="50000"/>
                 </a:schemeClr>
               </a:solidFill>
+              <a:latin typeface="Average" panose="020B0604020202020204" charset="0"/>
             </a:rPr>
             <a:t>Loading data </a:t>
           </a:r>
         </a:p>
         <a:p>
-          <a:pPr marL="114300" lvl="1" indent="-114300" algn="l" defTabSz="666750">
+          <a:pPr marL="171450" lvl="1" indent="-171450" algn="l" defTabSz="711200">
             <a:lnSpc>
               <a:spcPct val="90000"/>
             </a:lnSpc>
@@ -5012,16 +4889,17 @@
             <a:buFont typeface="Arial" panose="020B0604020202020204" pitchFamily="34" charset="0"/>
             <a:buChar char="•"/>
           </a:pPr>
-          <a:endParaRPr lang="en-CA" sz="1500" kern="1200" dirty="0">
+          <a:endParaRPr lang="en-CA" sz="1600" kern="1200" dirty="0">
             <a:solidFill>
               <a:schemeClr val="bg1">
                 <a:lumMod val="50000"/>
               </a:schemeClr>
             </a:solidFill>
+            <a:latin typeface="Average" panose="020B0604020202020204" charset="0"/>
           </a:endParaRPr>
         </a:p>
         <a:p>
-          <a:pPr marL="114300" lvl="1" indent="-114300" algn="l" defTabSz="666750">
+          <a:pPr marL="171450" lvl="1" indent="-171450" algn="l" defTabSz="711200">
             <a:lnSpc>
               <a:spcPct val="90000"/>
             </a:lnSpc>
@@ -5035,18 +4913,19 @@
             <a:buChar char="•"/>
           </a:pPr>
           <a:r>
-            <a:rPr lang="en-CA" sz="1500" kern="1200" dirty="0">
+            <a:rPr lang="en-CA" sz="1600" kern="1200" dirty="0">
               <a:solidFill>
                 <a:schemeClr val="bg1">
                   <a:lumMod val="50000"/>
                 </a:schemeClr>
               </a:solidFill>
+              <a:latin typeface="Average" panose="020B0604020202020204" charset="0"/>
             </a:rPr>
             <a:t>Target variable visualization</a:t>
           </a:r>
         </a:p>
         <a:p>
-          <a:pPr marL="114300" lvl="1" indent="-114300" algn="l" defTabSz="666750">
+          <a:pPr marL="171450" lvl="1" indent="-171450" algn="l" defTabSz="711200">
             <a:lnSpc>
               <a:spcPct val="90000"/>
             </a:lnSpc>
@@ -5059,16 +4938,17 @@
             <a:buFont typeface="Arial" panose="020B0604020202020204" pitchFamily="34" charset="0"/>
             <a:buNone/>
           </a:pPr>
-          <a:endParaRPr lang="en-CA" sz="1500" kern="1200" dirty="0">
+          <a:endParaRPr lang="en-CA" sz="1600" kern="1200" dirty="0">
             <a:solidFill>
               <a:schemeClr val="bg1">
                 <a:lumMod val="50000"/>
               </a:schemeClr>
             </a:solidFill>
+            <a:latin typeface="Average" panose="020B0604020202020204" charset="0"/>
           </a:endParaRPr>
         </a:p>
         <a:p>
-          <a:pPr marL="114300" lvl="1" indent="-114300" algn="l" defTabSz="666750">
+          <a:pPr marL="171450" lvl="1" indent="-171450" algn="l" defTabSz="711200">
             <a:lnSpc>
               <a:spcPct val="90000"/>
             </a:lnSpc>
@@ -5082,18 +4962,19 @@
             <a:buChar char="•"/>
           </a:pPr>
           <a:r>
-            <a:rPr lang="en-CA" sz="1500" kern="1200" dirty="0">
+            <a:rPr lang="en-CA" sz="1600" kern="1200" dirty="0">
               <a:solidFill>
                 <a:schemeClr val="bg1">
                   <a:lumMod val="50000"/>
                 </a:schemeClr>
               </a:solidFill>
+              <a:latin typeface="Average" panose="020B0604020202020204" charset="0"/>
             </a:rPr>
             <a:t>Other variable against target variable visualizations.</a:t>
           </a:r>
         </a:p>
         <a:p>
-          <a:pPr marL="114300" lvl="1" indent="-114300" algn="l" defTabSz="666750">
+          <a:pPr marL="171450" lvl="1" indent="-171450" algn="l" defTabSz="711200">
             <a:lnSpc>
               <a:spcPct val="90000"/>
             </a:lnSpc>
@@ -5106,16 +4987,17 @@
             <a:buFont typeface="Arial" panose="020B0604020202020204" pitchFamily="34" charset="0"/>
             <a:buChar char="•"/>
           </a:pPr>
-          <a:endParaRPr lang="en-CA" sz="1500" kern="1200" dirty="0">
+          <a:endParaRPr lang="en-CA" sz="1600" kern="1200" dirty="0">
             <a:solidFill>
               <a:schemeClr val="bg1">
                 <a:lumMod val="50000"/>
               </a:schemeClr>
             </a:solidFill>
+            <a:latin typeface="Average" panose="020B0604020202020204" charset="0"/>
           </a:endParaRPr>
         </a:p>
         <a:p>
-          <a:pPr marL="114300" lvl="1" indent="-114300" algn="l" defTabSz="666750">
+          <a:pPr marL="171450" lvl="1" indent="-171450" algn="l" defTabSz="711200">
             <a:lnSpc>
               <a:spcPct val="90000"/>
             </a:lnSpc>
@@ -5129,18 +5011,19 @@
             <a:buChar char="•"/>
           </a:pPr>
           <a:r>
-            <a:rPr lang="en-CA" sz="1500" kern="1200" dirty="0">
+            <a:rPr lang="en-CA" sz="1600" kern="1200" dirty="0">
               <a:solidFill>
                 <a:schemeClr val="bg1">
                   <a:lumMod val="50000"/>
                 </a:schemeClr>
               </a:solidFill>
+              <a:latin typeface="Average" panose="020B0604020202020204" charset="0"/>
             </a:rPr>
             <a:t>Correlation Visualization. </a:t>
           </a:r>
         </a:p>
         <a:p>
-          <a:pPr marL="114300" lvl="1" indent="-114300" algn="l" defTabSz="666750">
+          <a:pPr marL="171450" lvl="1" indent="-171450" algn="l" defTabSz="711200">
             <a:lnSpc>
               <a:spcPct val="90000"/>
             </a:lnSpc>
@@ -5153,7 +5036,7 @@
             <a:buFont typeface="Arial" panose="020B0604020202020204" pitchFamily="34" charset="0"/>
             <a:buChar char="•"/>
           </a:pPr>
-          <a:endParaRPr lang="en-CA" sz="1500" kern="1200" dirty="0">
+          <a:endParaRPr lang="en-CA" sz="1600" kern="1200" dirty="0">
             <a:solidFill>
               <a:schemeClr val="bg1">
                 <a:lumMod val="50000"/>
@@ -5163,8 +5046,8 @@
         </a:p>
       </dsp:txBody>
       <dsp:txXfrm>
-        <a:off x="5922506" y="775105"/>
-        <a:ext cx="2596422" cy="3314587"/>
+        <a:off x="5922506" y="599909"/>
+        <a:ext cx="2596422" cy="3689280"/>
       </dsp:txXfrm>
     </dsp:sp>
   </dsp:spTree>
@@ -5885,47 +5768,7 @@
                 </a:schemeClr>
               </a:solidFill>
             </a:rPr>
-            <a:t>Smoking, </a:t>
-          </a:r>
-          <a:r>
-            <a:rPr lang="en-CA" sz="1600" kern="1200" dirty="0" err="1">
-              <a:solidFill>
-                <a:schemeClr val="bg1">
-                  <a:lumMod val="50000"/>
-                </a:schemeClr>
-              </a:solidFill>
-            </a:rPr>
-            <a:t>AlcoholDrinking</a:t>
-          </a:r>
-          <a:r>
-            <a:rPr lang="en-CA" sz="1600" kern="1200" dirty="0">
-              <a:solidFill>
-                <a:schemeClr val="bg1">
-                  <a:lumMod val="50000"/>
-                </a:schemeClr>
-              </a:solidFill>
-            </a:rPr>
-            <a:t>, Stroke, Sex, </a:t>
-          </a:r>
-          <a:r>
-            <a:rPr lang="en-CA" sz="1600" kern="1200" dirty="0" err="1">
-              <a:solidFill>
-                <a:schemeClr val="bg1">
-                  <a:lumMod val="50000"/>
-                </a:schemeClr>
-              </a:solidFill>
-            </a:rPr>
-            <a:t>PhysicalActivity</a:t>
-          </a:r>
-          <a:r>
-            <a:rPr lang="en-CA" sz="1600" kern="1200" dirty="0">
-              <a:solidFill>
-                <a:schemeClr val="bg1">
-                  <a:lumMod val="50000"/>
-                </a:schemeClr>
-              </a:solidFill>
-            </a:rPr>
-            <a:t>, </a:t>
+            <a:t>Smoking, AlcoholDrinking, Stroke, Sex, PhysicalActivity, </a:t>
           </a:r>
         </a:p>
         <a:p>
@@ -5950,65 +5793,8 @@
                 </a:schemeClr>
               </a:solidFill>
             </a:rPr>
-            <a:t>Asthma, </a:t>
+            <a:t>Asthma, KidneyDisease, SkinCancer, Diffwalking</a:t>
           </a:r>
-          <a:r>
-            <a:rPr lang="en-CA" sz="1600" kern="1200" dirty="0" err="1">
-              <a:solidFill>
-                <a:schemeClr val="bg1">
-                  <a:lumMod val="50000"/>
-                </a:schemeClr>
-              </a:solidFill>
-            </a:rPr>
-            <a:t>KidneyDisease</a:t>
-          </a:r>
-          <a:r>
-            <a:rPr lang="en-CA" sz="1600" kern="1200" dirty="0">
-              <a:solidFill>
-                <a:schemeClr val="bg1">
-                  <a:lumMod val="50000"/>
-                </a:schemeClr>
-              </a:solidFill>
-            </a:rPr>
-            <a:t>, </a:t>
-          </a:r>
-          <a:r>
-            <a:rPr lang="en-CA" sz="1600" kern="1200" dirty="0" err="1">
-              <a:solidFill>
-                <a:schemeClr val="bg1">
-                  <a:lumMod val="50000"/>
-                </a:schemeClr>
-              </a:solidFill>
-            </a:rPr>
-            <a:t>SkinCancer</a:t>
-          </a:r>
-          <a:r>
-            <a:rPr lang="en-CA" sz="1600" kern="1200" dirty="0">
-              <a:solidFill>
-                <a:schemeClr val="bg1">
-                  <a:lumMod val="50000"/>
-                </a:schemeClr>
-              </a:solidFill>
-            </a:rPr>
-            <a:t>, </a:t>
-          </a:r>
-          <a:r>
-            <a:rPr lang="en-CA" sz="1600" kern="1200" dirty="0" err="1">
-              <a:solidFill>
-                <a:schemeClr val="bg1">
-                  <a:lumMod val="50000"/>
-                </a:schemeClr>
-              </a:solidFill>
-            </a:rPr>
-            <a:t>Diffwalking</a:t>
-          </a:r>
-          <a:endParaRPr lang="en-CA" sz="1600" kern="1200" dirty="0">
-            <a:solidFill>
-              <a:schemeClr val="bg1">
-                <a:lumMod val="50000"/>
-              </a:schemeClr>
-            </a:solidFill>
-          </a:endParaRPr>
         </a:p>
       </dsp:txBody>
       <dsp:txXfrm>
@@ -6160,27 +5946,7 @@
                 </a:schemeClr>
               </a:solidFill>
             </a:rPr>
-            <a:t>BMI, </a:t>
-          </a:r>
-          <a:r>
-            <a:rPr lang="en-CA" sz="1600" b="0" kern="1200" dirty="0" err="1">
-              <a:solidFill>
-                <a:schemeClr val="bg1">
-                  <a:lumMod val="50000"/>
-                </a:schemeClr>
-              </a:solidFill>
-            </a:rPr>
-            <a:t>PhysicalHealth</a:t>
-          </a:r>
-          <a:r>
-            <a:rPr lang="en-CA" sz="1600" b="0" kern="1200" dirty="0">
-              <a:solidFill>
-                <a:schemeClr val="bg1">
-                  <a:lumMod val="50000"/>
-                </a:schemeClr>
-              </a:solidFill>
-            </a:rPr>
-            <a:t>,</a:t>
+            <a:t>BMI, PhysicalHealth,</a:t>
           </a:r>
         </a:p>
         <a:p>
@@ -6197,16 +5963,6 @@
             <a:buNone/>
           </a:pPr>
           <a:r>
-            <a:rPr lang="en-CA" sz="1600" b="0" kern="1200" dirty="0" err="1">
-              <a:solidFill>
-                <a:schemeClr val="bg1">
-                  <a:lumMod val="50000"/>
-                </a:schemeClr>
-              </a:solidFill>
-            </a:rPr>
-            <a:t>MentalHealth</a:t>
-          </a:r>
-          <a:r>
             <a:rPr lang="en-CA" sz="1600" b="0" kern="1200" dirty="0">
               <a:solidFill>
                 <a:schemeClr val="bg1">
@@ -6214,7 +5970,7 @@
                 </a:schemeClr>
               </a:solidFill>
             </a:rPr>
-            <a:t>,</a:t>
+            <a:t>MentalHealth,</a:t>
           </a:r>
         </a:p>
         <a:p>
@@ -6231,16 +5987,6 @@
             <a:buNone/>
           </a:pPr>
           <a:r>
-            <a:rPr lang="en-CA" sz="1600" b="0" kern="1200" dirty="0" err="1">
-              <a:solidFill>
-                <a:schemeClr val="bg1">
-                  <a:lumMod val="50000"/>
-                </a:schemeClr>
-              </a:solidFill>
-            </a:rPr>
-            <a:t>AgeCategory</a:t>
-          </a:r>
-          <a:r>
             <a:rPr lang="en-CA" sz="1600" b="0" kern="1200" dirty="0">
               <a:solidFill>
                 <a:schemeClr val="bg1">
@@ -6248,7 +5994,7 @@
                 </a:schemeClr>
               </a:solidFill>
             </a:rPr>
-            <a:t>,</a:t>
+            <a:t>AgeCategory,</a:t>
           </a:r>
         </a:p>
         <a:p>
@@ -6265,16 +6011,6 @@
             <a:buNone/>
           </a:pPr>
           <a:r>
-            <a:rPr lang="en-CA" sz="1600" b="0" kern="1200" dirty="0" err="1">
-              <a:solidFill>
-                <a:schemeClr val="bg1">
-                  <a:lumMod val="50000"/>
-                </a:schemeClr>
-              </a:solidFill>
-            </a:rPr>
-            <a:t>GeneralHealth</a:t>
-          </a:r>
-          <a:r>
             <a:rPr lang="en-CA" sz="1600" b="0" kern="1200" dirty="0">
               <a:solidFill>
                 <a:schemeClr val="bg1">
@@ -6282,7 +6018,7 @@
                 </a:schemeClr>
               </a:solidFill>
             </a:rPr>
-            <a:t>,</a:t>
+            <a:t>GeneralHealth,</a:t>
           </a:r>
         </a:p>
         <a:p>
@@ -6323,16 +6059,6 @@
             <a:buNone/>
           </a:pPr>
           <a:r>
-            <a:rPr lang="en-CA" sz="1600" b="0" kern="1200" dirty="0" err="1">
-              <a:solidFill>
-                <a:schemeClr val="bg1">
-                  <a:lumMod val="50000"/>
-                </a:schemeClr>
-              </a:solidFill>
-            </a:rPr>
-            <a:t>Sleeptime</a:t>
-          </a:r>
-          <a:r>
             <a:rPr lang="en-CA" sz="1600" b="0" kern="1200" dirty="0">
               <a:solidFill>
                 <a:schemeClr val="bg1">
@@ -6340,7 +6066,7 @@
                 </a:schemeClr>
               </a:solidFill>
             </a:rPr>
-            <a:t>, Race</a:t>
+            <a:t>Sleeptime, Race</a:t>
           </a:r>
         </a:p>
         <a:p>
@@ -18980,9 +18706,7 @@
           </a:solidFill>
           <a:ln>
             <a:solidFill>
-              <a:schemeClr val="accent5">
-                <a:lumMod val="75000"/>
-              </a:schemeClr>
+              <a:schemeClr val="tx1"/>
             </a:solidFill>
           </a:ln>
           <a:effectLst>
@@ -19118,7 +18842,7 @@
           </a:solidFill>
           <a:ln>
             <a:solidFill>
-              <a:srgbClr val="FFC000"/>
+              <a:schemeClr val="tx1"/>
             </a:solidFill>
           </a:ln>
           <a:effectLst>
@@ -19186,7 +18910,7 @@
           </a:solidFill>
           <a:ln>
             <a:solidFill>
-              <a:srgbClr val="FFC000"/>
+              <a:schemeClr val="tx1"/>
             </a:solidFill>
           </a:ln>
           <a:effectLst>
@@ -19254,9 +18978,7 @@
           </a:solidFill>
           <a:ln>
             <a:solidFill>
-              <a:schemeClr val="accent5">
-                <a:lumMod val="75000"/>
-              </a:schemeClr>
+              <a:schemeClr val="tx1"/>
             </a:solidFill>
           </a:ln>
           <a:effectLst>
@@ -19550,7 +19272,7 @@
           </a:prstGeom>
           <a:ln>
             <a:solidFill>
-              <a:srgbClr val="FF0000"/>
+              <a:schemeClr val="tx1"/>
             </a:solidFill>
           </a:ln>
           <a:effectLst>
@@ -20046,17 +19768,44 @@
                 </a:solidFill>
                 <a:latin typeface="Average" panose="020B0604020202020204" charset="0"/>
               </a:rPr>
-              <a:t>After completing the project and viewing the predictions , we can see that the machine learning models selected allow us to get a strong prediction from the data provided, specifically by oversampled  linear regression model. </a:t>
+              <a:t>All the models are equally tuned to correctly predict heart disease risk potential</a:t>
             </a:r>
+          </a:p>
+          <a:p>
+            <a:pPr marL="114300" indent="0">
+              <a:buNone/>
+            </a:pPr>
+            <a:endParaRPr lang="en-CA" dirty="0">
+              <a:solidFill>
+                <a:schemeClr val="tx1"/>
+              </a:solidFill>
+              <a:latin typeface="Average" panose="020B0604020202020204" charset="0"/>
+            </a:endParaRPr>
+          </a:p>
+          <a:p>
+            <a:pPr marL="114300" indent="0">
+              <a:buNone/>
+            </a:pPr>
+            <a:endParaRPr lang="en-CA" dirty="0">
+              <a:solidFill>
+                <a:schemeClr val="tx1"/>
+              </a:solidFill>
+              <a:latin typeface="Average" panose="020B0604020202020204" charset="0"/>
+            </a:endParaRPr>
+          </a:p>
+          <a:p>
+            <a:pPr>
+              <a:buFont typeface="Wingdings" panose="05000000000000000000" pitchFamily="2" charset="2"/>
+              <a:buChar char="ü"/>
+            </a:pPr>
             <a:r>
-              <a:rPr lang="en-CA" b="0" i="0" dirty="0">
+              <a:rPr lang="en-CA" dirty="0">
                 <a:solidFill>
                   <a:schemeClr val="tx1"/>
                 </a:solidFill>
-                <a:effectLst/>
                 <a:latin typeface="Average" panose="020B0604020202020204" charset="0"/>
               </a:rPr>
-              <a:t>It consistently had the highest scores, particularly in accuracy, precision, and sensitivity, and thus correctly made the correct predictions compared to the other models.</a:t>
+              <a:t>However Random forest model slightly edged out the other models.</a:t>
             </a:r>
           </a:p>
           <a:p>
@@ -20091,8 +19840,18 @@
                   <a:schemeClr val="tx1"/>
                 </a:solidFill>
               </a:rPr>
-              <a:t>In conclusion , the data provided can be correlated in determining predicting getting heart disease or not getting heart disease. </a:t>
+              <a:t>As per the feature important analysis sleep time, Physical health, Mental health and BMI obesity are shown as the key indicators for the prediction. </a:t>
             </a:r>
+          </a:p>
+          <a:p>
+            <a:pPr marL="114300" indent="0">
+              <a:buNone/>
+            </a:pPr>
+            <a:endParaRPr lang="en-CA" dirty="0">
+              <a:solidFill>
+                <a:schemeClr val="tx1"/>
+              </a:solidFill>
+            </a:endParaRPr>
           </a:p>
           <a:p>
             <a:pPr>
@@ -20104,6 +19863,20 @@
                 <a:schemeClr val="tx1"/>
               </a:solidFill>
             </a:endParaRPr>
+          </a:p>
+          <a:p>
+            <a:pPr>
+              <a:buFont typeface="Wingdings" panose="05000000000000000000" pitchFamily="2" charset="2"/>
+              <a:buChar char="ü"/>
+            </a:pPr>
+            <a:r>
+              <a:rPr lang="en-CA" dirty="0">
+                <a:solidFill>
+                  <a:schemeClr val="tx1"/>
+                </a:solidFill>
+              </a:rPr>
+              <a:t>Age category between 18-24, 25-29, 30-34 , Race-Asian , Diabetic during pregnancy features are shown as the least factors for the prediction heart disease. </a:t>
+            </a:r>
           </a:p>
           <a:p>
             <a:pPr marL="114300" indent="0">
@@ -22852,7 +22625,7 @@
           <p:nvPr>
             <p:extLst>
               <p:ext uri="{D42A27DB-BD31-4B8C-83A1-F6EECF244321}">
-                <p14:modId xmlns:p14="http://schemas.microsoft.com/office/powerpoint/2010/main" val="3085560099"/>
+                <p14:modId xmlns:p14="http://schemas.microsoft.com/office/powerpoint/2010/main" val="110458779"/>
               </p:ext>
             </p:extLst>
           </p:nvPr>

</xml_diff>